<commit_message>
- basic functions are added to UI (hold, clamp, etc) - also create Oxford-1820-Main-Launcher.vi
</commit_message>
<xml_diff>
--- a/documentation/Tree.pptx
+++ b/documentation/Tree.pptx
@@ -3323,6 +3323,107 @@
       </p:grpSpPr>
       <p:sp>
         <p:nvSpPr>
+          <p:cNvPr id="135" name="Rectangle 134">
+            <a:extLst>
+              <a:ext uri="{FF2B5EF4-FFF2-40B4-BE49-F238E27FC236}">
+                <a16:creationId xmlns:a16="http://schemas.microsoft.com/office/drawing/2014/main" id="{289A9F24-BEA7-47F9-989A-4F8F52CE8A54}"/>
+              </a:ext>
+            </a:extLst>
+          </p:cNvPr>
+          <p:cNvSpPr/>
+          <p:nvPr/>
+        </p:nvSpPr>
+        <p:spPr>
+          <a:xfrm>
+            <a:off x="8316640" y="4711418"/>
+            <a:ext cx="3636484" cy="344537"/>
+          </a:xfrm>
+          <a:prstGeom prst="rect">
+            <a:avLst/>
+          </a:prstGeom>
+          <a:solidFill>
+            <a:srgbClr val="99FF99"/>
+          </a:solidFill>
+        </p:spPr>
+        <p:style>
+          <a:lnRef idx="2">
+            <a:schemeClr val="accent6">
+              <a:shade val="50000"/>
+            </a:schemeClr>
+          </a:lnRef>
+          <a:fillRef idx="1">
+            <a:schemeClr val="accent6"/>
+          </a:fillRef>
+          <a:effectRef idx="0">
+            <a:schemeClr val="accent6"/>
+          </a:effectRef>
+          <a:fontRef idx="minor">
+            <a:schemeClr val="lt1"/>
+          </a:fontRef>
+        </p:style>
+        <p:txBody>
+          <a:bodyPr rtlCol="0" anchor="ctr"/>
+          <a:lstStyle/>
+          <a:p>
+            <a:pPr algn="ctr"/>
+            <a:r>
+              <a:rPr lang="en-US" dirty="0"/>
+              <a:t>Remote Community Methods</a:t>
+            </a:r>
+          </a:p>
+        </p:txBody>
+      </p:sp>
+      <p:sp>
+        <p:nvSpPr>
+          <p:cNvPr id="134" name="Rectangle 133">
+            <a:extLst>
+              <a:ext uri="{FF2B5EF4-FFF2-40B4-BE49-F238E27FC236}">
+                <a16:creationId xmlns:a16="http://schemas.microsoft.com/office/drawing/2014/main" id="{EB8CD589-7AB9-439C-A220-0003A9649F1D}"/>
+              </a:ext>
+            </a:extLst>
+          </p:cNvPr>
+          <p:cNvSpPr/>
+          <p:nvPr/>
+        </p:nvSpPr>
+        <p:spPr>
+          <a:xfrm>
+            <a:off x="8316640" y="4331732"/>
+            <a:ext cx="3636484" cy="344537"/>
+          </a:xfrm>
+          <a:prstGeom prst="rect">
+            <a:avLst/>
+          </a:prstGeom>
+        </p:spPr>
+        <p:style>
+          <a:lnRef idx="2">
+            <a:schemeClr val="accent2">
+              <a:shade val="50000"/>
+            </a:schemeClr>
+          </a:lnRef>
+          <a:fillRef idx="1">
+            <a:schemeClr val="accent2"/>
+          </a:fillRef>
+          <a:effectRef idx="0">
+            <a:schemeClr val="accent2"/>
+          </a:effectRef>
+          <a:fontRef idx="minor">
+            <a:schemeClr val="lt1"/>
+          </a:fontRef>
+        </p:style>
+        <p:txBody>
+          <a:bodyPr rtlCol="0" anchor="ctr"/>
+          <a:lstStyle/>
+          <a:p>
+            <a:pPr algn="ctr"/>
+            <a:r>
+              <a:rPr lang="en-US" dirty="0"/>
+              <a:t>TCP Layer</a:t>
+            </a:r>
+          </a:p>
+        </p:txBody>
+      </p:sp>
+      <p:sp>
+        <p:nvSpPr>
           <p:cNvPr id="9" name="Rectangle 8">
             <a:extLst>
               <a:ext uri="{FF2B5EF4-FFF2-40B4-BE49-F238E27FC236}">
@@ -3507,10 +3608,10 @@
       </p:sp>
       <p:pic>
         <p:nvPicPr>
-          <p:cNvPr id="7" name="Picture 6">
-            <a:extLst>
-              <a:ext uri="{FF2B5EF4-FFF2-40B4-BE49-F238E27FC236}">
-                <a16:creationId xmlns:a16="http://schemas.microsoft.com/office/drawing/2014/main" id="{4BD81C8D-2260-4B76-9C3D-3D01866B2CD6}"/>
+          <p:cNvPr id="8" name="Picture 7">
+            <a:extLst>
+              <a:ext uri="{FF2B5EF4-FFF2-40B4-BE49-F238E27FC236}">
+                <a16:creationId xmlns:a16="http://schemas.microsoft.com/office/drawing/2014/main" id="{DA3E0318-C031-42BB-949D-B541C8C7EBBA}"/>
               </a:ext>
             </a:extLst>
           </p:cNvPr>
@@ -3527,36 +3628,6 @@
         </p:blipFill>
         <p:spPr>
           <a:xfrm>
-            <a:off x="5961461" y="3481387"/>
-            <a:ext cx="304800" cy="304800"/>
-          </a:xfrm>
-          <a:prstGeom prst="rect">
-            <a:avLst/>
-          </a:prstGeom>
-        </p:spPr>
-      </p:pic>
-      <p:pic>
-        <p:nvPicPr>
-          <p:cNvPr id="8" name="Picture 7">
-            <a:extLst>
-              <a:ext uri="{FF2B5EF4-FFF2-40B4-BE49-F238E27FC236}">
-                <a16:creationId xmlns:a16="http://schemas.microsoft.com/office/drawing/2014/main" id="{DA3E0318-C031-42BB-949D-B541C8C7EBBA}"/>
-              </a:ext>
-            </a:extLst>
-          </p:cNvPr>
-          <p:cNvPicPr>
-            <a:picLocks noChangeAspect="1"/>
-          </p:cNvPicPr>
-          <p:nvPr/>
-        </p:nvPicPr>
-        <p:blipFill>
-          <a:blip r:embed="rId3"/>
-          <a:stretch>
-            <a:fillRect/>
-          </a:stretch>
-        </p:blipFill>
-        <p:spPr>
-          <a:xfrm>
             <a:off x="5961461" y="2890837"/>
             <a:ext cx="304800" cy="304800"/>
           </a:xfrm>
@@ -3580,7 +3651,7 @@
           <p:nvPr/>
         </p:nvPicPr>
         <p:blipFill>
-          <a:blip r:embed="rId4">
+          <a:blip r:embed="rId3">
             <a:extLst>
               <a:ext uri="{28A0092B-C50C-407E-A947-70E740481C1C}">
                 <a14:useLocalDpi xmlns:a14="http://schemas.microsoft.com/office/drawing/2010/main" val="0"/>
@@ -3627,7 +3698,7 @@
           <p:nvPr/>
         </p:nvPicPr>
         <p:blipFill>
-          <a:blip r:embed="rId5">
+          <a:blip r:embed="rId4">
             <a:extLst>
               <a:ext uri="{28A0092B-C50C-407E-A947-70E740481C1C}">
                 <a14:useLocalDpi xmlns:a14="http://schemas.microsoft.com/office/drawing/2010/main" val="0"/>
@@ -3935,25 +4006,441 @@
           </a:fontRef>
         </p:style>
       </p:cxnSp>
+      <p:pic>
+        <p:nvPicPr>
+          <p:cNvPr id="33" name="Picture 32">
+            <a:extLst>
+              <a:ext uri="{FF2B5EF4-FFF2-40B4-BE49-F238E27FC236}">
+                <a16:creationId xmlns:a16="http://schemas.microsoft.com/office/drawing/2014/main" id="{C643A4BD-A046-4D5D-B48E-649D79E3FCE0}"/>
+              </a:ext>
+            </a:extLst>
+          </p:cNvPr>
+          <p:cNvPicPr>
+            <a:picLocks noChangeAspect="1"/>
+          </p:cNvPicPr>
+          <p:nvPr/>
+        </p:nvPicPr>
+        <p:blipFill>
+          <a:blip r:embed="rId5"/>
+          <a:stretch>
+            <a:fillRect/>
+          </a:stretch>
+        </p:blipFill>
+        <p:spPr>
+          <a:xfrm>
+            <a:off x="2453877" y="2114550"/>
+            <a:ext cx="3971925" cy="304800"/>
+          </a:xfrm>
+          <a:prstGeom prst="rect">
+            <a:avLst/>
+          </a:prstGeom>
+        </p:spPr>
+      </p:pic>
+      <p:pic>
+        <p:nvPicPr>
+          <p:cNvPr id="34" name="Picture 33">
+            <a:extLst>
+              <a:ext uri="{FF2B5EF4-FFF2-40B4-BE49-F238E27FC236}">
+                <a16:creationId xmlns:a16="http://schemas.microsoft.com/office/drawing/2014/main" id="{FABBEDA2-7C0F-4A7A-A7F6-DF1266FA83CC}"/>
+              </a:ext>
+            </a:extLst>
+          </p:cNvPr>
+          <p:cNvPicPr>
+            <a:picLocks noChangeAspect="1"/>
+          </p:cNvPicPr>
+          <p:nvPr/>
+        </p:nvPicPr>
+        <p:blipFill>
+          <a:blip r:embed="rId6"/>
+          <a:stretch>
+            <a:fillRect/>
+          </a:stretch>
+        </p:blipFill>
+        <p:spPr>
+          <a:xfrm>
+            <a:off x="8007789" y="2095500"/>
+            <a:ext cx="638175" cy="304800"/>
+          </a:xfrm>
+          <a:prstGeom prst="rect">
+            <a:avLst/>
+          </a:prstGeom>
+        </p:spPr>
+      </p:pic>
+      <p:pic>
+        <p:nvPicPr>
+          <p:cNvPr id="35" name="Picture 34">
+            <a:extLst>
+              <a:ext uri="{FF2B5EF4-FFF2-40B4-BE49-F238E27FC236}">
+                <a16:creationId xmlns:a16="http://schemas.microsoft.com/office/drawing/2014/main" id="{2EFCF48F-140E-4EE0-AD69-9FD41168B2D4}"/>
+              </a:ext>
+            </a:extLst>
+          </p:cNvPr>
+          <p:cNvPicPr>
+            <a:picLocks noChangeAspect="1"/>
+          </p:cNvPicPr>
+          <p:nvPr/>
+        </p:nvPicPr>
+        <p:blipFill>
+          <a:blip r:embed="rId7"/>
+          <a:stretch>
+            <a:fillRect/>
+          </a:stretch>
+        </p:blipFill>
+        <p:spPr>
+          <a:xfrm>
+            <a:off x="6559513" y="2119313"/>
+            <a:ext cx="1304925" cy="304800"/>
+          </a:xfrm>
+          <a:prstGeom prst="rect">
+            <a:avLst/>
+          </a:prstGeom>
+        </p:spPr>
+      </p:pic>
+      <p:pic>
+        <p:nvPicPr>
+          <p:cNvPr id="36" name="Picture 35">
+            <a:extLst>
+              <a:ext uri="{FF2B5EF4-FFF2-40B4-BE49-F238E27FC236}">
+                <a16:creationId xmlns:a16="http://schemas.microsoft.com/office/drawing/2014/main" id="{7C9B6F85-7BF1-45FE-82E5-7F12D7278C6E}"/>
+              </a:ext>
+            </a:extLst>
+          </p:cNvPr>
+          <p:cNvPicPr>
+            <a:picLocks noChangeAspect="1"/>
+          </p:cNvPicPr>
+          <p:nvPr/>
+        </p:nvPicPr>
+        <p:blipFill>
+          <a:blip r:embed="rId8"/>
+          <a:stretch>
+            <a:fillRect/>
+          </a:stretch>
+        </p:blipFill>
+        <p:spPr>
+          <a:xfrm>
+            <a:off x="8788005" y="2095500"/>
+            <a:ext cx="638175" cy="304800"/>
+          </a:xfrm>
+          <a:prstGeom prst="rect">
+            <a:avLst/>
+          </a:prstGeom>
+        </p:spPr>
+      </p:pic>
+      <p:pic>
+        <p:nvPicPr>
+          <p:cNvPr id="1031" name="Picture 1030">
+            <a:extLst>
+              <a:ext uri="{FF2B5EF4-FFF2-40B4-BE49-F238E27FC236}">
+                <a16:creationId xmlns:a16="http://schemas.microsoft.com/office/drawing/2014/main" id="{A426A376-C2EB-4C92-8769-031B53DE0B1D}"/>
+              </a:ext>
+            </a:extLst>
+          </p:cNvPr>
+          <p:cNvPicPr>
+            <a:picLocks noChangeAspect="1"/>
+          </p:cNvPicPr>
+          <p:nvPr/>
+        </p:nvPicPr>
+        <p:blipFill>
+          <a:blip r:embed="rId9"/>
+          <a:stretch>
+            <a:fillRect/>
+          </a:stretch>
+        </p:blipFill>
+        <p:spPr>
+          <a:xfrm>
+            <a:off x="6021826" y="5926182"/>
+            <a:ext cx="304800" cy="304800"/>
+          </a:xfrm>
+          <a:prstGeom prst="rect">
+            <a:avLst/>
+          </a:prstGeom>
+        </p:spPr>
+      </p:pic>
+      <p:pic>
+        <p:nvPicPr>
+          <p:cNvPr id="1034" name="Picture 1033">
+            <a:extLst>
+              <a:ext uri="{FF2B5EF4-FFF2-40B4-BE49-F238E27FC236}">
+                <a16:creationId xmlns:a16="http://schemas.microsoft.com/office/drawing/2014/main" id="{24D7F6A3-6B36-4A6A-A3E9-2AF5AE55A96E}"/>
+              </a:ext>
+            </a:extLst>
+          </p:cNvPr>
+          <p:cNvPicPr>
+            <a:picLocks noChangeAspect="1"/>
+          </p:cNvPicPr>
+          <p:nvPr/>
+        </p:nvPicPr>
+        <p:blipFill>
+          <a:blip r:embed="rId10"/>
+          <a:stretch>
+            <a:fillRect/>
+          </a:stretch>
+        </p:blipFill>
+        <p:spPr>
+          <a:xfrm>
+            <a:off x="3390900" y="4751155"/>
+            <a:ext cx="304800" cy="304800"/>
+          </a:xfrm>
+          <a:prstGeom prst="rect">
+            <a:avLst/>
+          </a:prstGeom>
+        </p:spPr>
+      </p:pic>
+      <p:pic>
+        <p:nvPicPr>
+          <p:cNvPr id="1035" name="Picture 1034">
+            <a:extLst>
+              <a:ext uri="{FF2B5EF4-FFF2-40B4-BE49-F238E27FC236}">
+                <a16:creationId xmlns:a16="http://schemas.microsoft.com/office/drawing/2014/main" id="{F1836E26-9C77-4D26-ADCA-A09A8850F1D0}"/>
+              </a:ext>
+            </a:extLst>
+          </p:cNvPr>
+          <p:cNvPicPr>
+            <a:picLocks noChangeAspect="1"/>
+          </p:cNvPicPr>
+          <p:nvPr/>
+        </p:nvPicPr>
+        <p:blipFill>
+          <a:blip r:embed="rId11"/>
+          <a:stretch>
+            <a:fillRect/>
+          </a:stretch>
+        </p:blipFill>
+        <p:spPr>
+          <a:xfrm>
+            <a:off x="2745936" y="4751155"/>
+            <a:ext cx="304800" cy="304800"/>
+          </a:xfrm>
+          <a:prstGeom prst="rect">
+            <a:avLst/>
+          </a:prstGeom>
+        </p:spPr>
+      </p:pic>
+      <p:sp>
+        <p:nvSpPr>
+          <p:cNvPr id="1036" name="TextBox 1035">
+            <a:extLst>
+              <a:ext uri="{FF2B5EF4-FFF2-40B4-BE49-F238E27FC236}">
+                <a16:creationId xmlns:a16="http://schemas.microsoft.com/office/drawing/2014/main" id="{A93A6ED4-6CCB-4CBB-B97D-A96799F36608}"/>
+              </a:ext>
+            </a:extLst>
+          </p:cNvPr>
+          <p:cNvSpPr txBox="1"/>
+          <p:nvPr/>
+        </p:nvSpPr>
+        <p:spPr>
+          <a:xfrm>
+            <a:off x="8326875" y="5401236"/>
+            <a:ext cx="3626249" cy="369332"/>
+          </a:xfrm>
+          <a:prstGeom prst="rect">
+            <a:avLst/>
+          </a:prstGeom>
+          <a:noFill/>
+        </p:spPr>
+        <p:txBody>
+          <a:bodyPr wrap="none" rtlCol="0">
+            <a:spAutoFit/>
+          </a:bodyPr>
+          <a:lstStyle/>
+          <a:p>
+            <a:r>
+              <a:rPr lang="en-US" dirty="0"/>
+              <a:t>Instrument.Oxford1820 </a:t>
+            </a:r>
+            <a:r>
+              <a:rPr lang="en-US" dirty="0" err="1"/>
+              <a:t>UI:process.vi</a:t>
+            </a:r>
+            <a:endParaRPr lang="en-US" dirty="0"/>
+          </a:p>
+        </p:txBody>
+      </p:sp>
+      <p:sp>
+        <p:nvSpPr>
+          <p:cNvPr id="77" name="TextBox 76">
+            <a:extLst>
+              <a:ext uri="{FF2B5EF4-FFF2-40B4-BE49-F238E27FC236}">
+                <a16:creationId xmlns:a16="http://schemas.microsoft.com/office/drawing/2014/main" id="{DE7C63F0-8702-4585-832D-CE41A0776329}"/>
+              </a:ext>
+            </a:extLst>
+          </p:cNvPr>
+          <p:cNvSpPr txBox="1"/>
+          <p:nvPr/>
+        </p:nvSpPr>
+        <p:spPr>
+          <a:xfrm>
+            <a:off x="8326875" y="3867273"/>
+            <a:ext cx="2734018" cy="369332"/>
+          </a:xfrm>
+          <a:prstGeom prst="rect">
+            <a:avLst/>
+          </a:prstGeom>
+          <a:noFill/>
+        </p:spPr>
+        <p:txBody>
+          <a:bodyPr wrap="none" rtlCol="0">
+            <a:spAutoFit/>
+          </a:bodyPr>
+          <a:lstStyle/>
+          <a:p>
+            <a:r>
+              <a:rPr lang="en-US" dirty="0"/>
+              <a:t>Instrument.1820:process.vi</a:t>
+            </a:r>
+          </a:p>
+        </p:txBody>
+      </p:sp>
+      <p:sp>
+        <p:nvSpPr>
+          <p:cNvPr id="78" name="TextBox 77">
+            <a:extLst>
+              <a:ext uri="{FF2B5EF4-FFF2-40B4-BE49-F238E27FC236}">
+                <a16:creationId xmlns:a16="http://schemas.microsoft.com/office/drawing/2014/main" id="{3C36F368-84F4-4661-8752-9AAAAD98E84C}"/>
+              </a:ext>
+            </a:extLst>
+          </p:cNvPr>
+          <p:cNvSpPr txBox="1"/>
+          <p:nvPr/>
+        </p:nvSpPr>
+        <p:spPr>
+          <a:xfrm>
+            <a:off x="9609536" y="2073473"/>
+            <a:ext cx="1225207" cy="369332"/>
+          </a:xfrm>
+          <a:prstGeom prst="rect">
+            <a:avLst/>
+          </a:prstGeom>
+          <a:noFill/>
+        </p:spPr>
+        <p:txBody>
+          <a:bodyPr wrap="none" rtlCol="0">
+            <a:spAutoFit/>
+          </a:bodyPr>
+          <a:lstStyle/>
+          <a:p>
+            <a:r>
+              <a:rPr lang="en-US" dirty="0"/>
+              <a:t>HW drivers</a:t>
+            </a:r>
+          </a:p>
+        </p:txBody>
+      </p:sp>
+      <p:sp>
+        <p:nvSpPr>
+          <p:cNvPr id="80" name="TextBox 79">
+            <a:extLst>
+              <a:ext uri="{FF2B5EF4-FFF2-40B4-BE49-F238E27FC236}">
+                <a16:creationId xmlns:a16="http://schemas.microsoft.com/office/drawing/2014/main" id="{FBD0E06A-C2ED-4D94-8808-B3293380F5A5}"/>
+              </a:ext>
+            </a:extLst>
+          </p:cNvPr>
+          <p:cNvSpPr txBox="1"/>
+          <p:nvPr/>
+        </p:nvSpPr>
+        <p:spPr>
+          <a:xfrm>
+            <a:off x="83175" y="4718889"/>
+            <a:ext cx="2175852" cy="369332"/>
+          </a:xfrm>
+          <a:prstGeom prst="rect">
+            <a:avLst/>
+          </a:prstGeom>
+          <a:noFill/>
+        </p:spPr>
+        <p:txBody>
+          <a:bodyPr wrap="none" rtlCol="0">
+            <a:spAutoFit/>
+          </a:bodyPr>
+          <a:lstStyle/>
+          <a:p>
+            <a:r>
+              <a:rPr lang="en-US" dirty="0"/>
+              <a:t>Remote API Methods</a:t>
+            </a:r>
+          </a:p>
+        </p:txBody>
+      </p:sp>
+      <p:pic>
+        <p:nvPicPr>
+          <p:cNvPr id="1037" name="Picture 1036">
+            <a:extLst>
+              <a:ext uri="{FF2B5EF4-FFF2-40B4-BE49-F238E27FC236}">
+                <a16:creationId xmlns:a16="http://schemas.microsoft.com/office/drawing/2014/main" id="{DF1F7904-C0EB-4686-90F9-7D5EC6B25DF8}"/>
+              </a:ext>
+            </a:extLst>
+          </p:cNvPr>
+          <p:cNvPicPr>
+            <a:picLocks noChangeAspect="1"/>
+          </p:cNvPicPr>
+          <p:nvPr/>
+        </p:nvPicPr>
+        <p:blipFill>
+          <a:blip r:embed="rId12"/>
+          <a:stretch>
+            <a:fillRect/>
+          </a:stretch>
+        </p:blipFill>
+        <p:spPr>
+          <a:xfrm>
+            <a:off x="5956698" y="3893906"/>
+            <a:ext cx="304800" cy="304800"/>
+          </a:xfrm>
+          <a:prstGeom prst="rect">
+            <a:avLst/>
+          </a:prstGeom>
+        </p:spPr>
+      </p:pic>
+      <p:pic>
+        <p:nvPicPr>
+          <p:cNvPr id="82" name="Picture 81">
+            <a:extLst>
+              <a:ext uri="{FF2B5EF4-FFF2-40B4-BE49-F238E27FC236}">
+                <a16:creationId xmlns:a16="http://schemas.microsoft.com/office/drawing/2014/main" id="{3729566A-513A-4B64-98C7-E38305572BB7}"/>
+              </a:ext>
+            </a:extLst>
+          </p:cNvPr>
+          <p:cNvPicPr>
+            <a:picLocks noChangeAspect="1"/>
+          </p:cNvPicPr>
+          <p:nvPr/>
+        </p:nvPicPr>
+        <p:blipFill>
+          <a:blip r:embed="rId13"/>
+          <a:stretch>
+            <a:fillRect/>
+          </a:stretch>
+        </p:blipFill>
+        <p:spPr>
+          <a:xfrm>
+            <a:off x="4104861" y="3228065"/>
+            <a:ext cx="304800" cy="304800"/>
+          </a:xfrm>
+          <a:prstGeom prst="rect">
+            <a:avLst/>
+          </a:prstGeom>
+        </p:spPr>
+      </p:pic>
       <p:cxnSp>
         <p:nvCxnSpPr>
-          <p:cNvPr id="31" name="Straight Arrow Connector 30">
-            <a:extLst>
-              <a:ext uri="{FF2B5EF4-FFF2-40B4-BE49-F238E27FC236}">
-                <a16:creationId xmlns:a16="http://schemas.microsoft.com/office/drawing/2014/main" id="{42A93F0F-C600-451F-9DA6-2A9995E5E751}"/>
+          <p:cNvPr id="83" name="Straight Arrow Connector 82">
+            <a:extLst>
+              <a:ext uri="{FF2B5EF4-FFF2-40B4-BE49-F238E27FC236}">
+                <a16:creationId xmlns:a16="http://schemas.microsoft.com/office/drawing/2014/main" id="{55EEDAF7-3453-4989-9375-20ACF4216F1B}"/>
               </a:ext>
             </a:extLst>
           </p:cNvPr>
           <p:cNvCxnSpPr>
-            <a:stCxn id="7" idx="0"/>
+            <a:cxnSpLocks/>
+            <a:stCxn id="1037" idx="0"/>
             <a:endCxn id="8" idx="2"/>
           </p:cNvCxnSpPr>
           <p:nvPr/>
         </p:nvCxnSpPr>
         <p:spPr>
           <a:xfrm flipV="1">
-            <a:off x="6113861" y="3195637"/>
-            <a:ext cx="0" cy="285750"/>
+            <a:off x="6109098" y="3195637"/>
+            <a:ext cx="4763" cy="698269"/>
           </a:xfrm>
           <a:prstGeom prst="straightConnector1">
             <a:avLst/>
@@ -3983,192 +4470,47 @@
           </a:fontRef>
         </p:style>
       </p:cxnSp>
-      <p:pic>
-        <p:nvPicPr>
-          <p:cNvPr id="33" name="Picture 32">
-            <a:extLst>
-              <a:ext uri="{FF2B5EF4-FFF2-40B4-BE49-F238E27FC236}">
-                <a16:creationId xmlns:a16="http://schemas.microsoft.com/office/drawing/2014/main" id="{C643A4BD-A046-4D5D-B48E-649D79E3FCE0}"/>
-              </a:ext>
-            </a:extLst>
-          </p:cNvPr>
-          <p:cNvPicPr>
-            <a:picLocks noChangeAspect="1"/>
-          </p:cNvPicPr>
+      <p:sp>
+        <p:nvSpPr>
+          <p:cNvPr id="87" name="TextBox 86">
+            <a:extLst>
+              <a:ext uri="{FF2B5EF4-FFF2-40B4-BE49-F238E27FC236}">
+                <a16:creationId xmlns:a16="http://schemas.microsoft.com/office/drawing/2014/main" id="{4B486B29-66E6-48E2-92FD-40C109E33CC7}"/>
+              </a:ext>
+            </a:extLst>
+          </p:cNvPr>
+          <p:cNvSpPr txBox="1"/>
           <p:nvPr/>
-        </p:nvPicPr>
-        <p:blipFill>
-          <a:blip r:embed="rId6"/>
-          <a:stretch>
-            <a:fillRect/>
-          </a:stretch>
-        </p:blipFill>
-        <p:spPr>
-          <a:xfrm>
-            <a:off x="2453877" y="2114550"/>
-            <a:ext cx="3971925" cy="304800"/>
+        </p:nvSpPr>
+        <p:spPr>
+          <a:xfrm>
+            <a:off x="8326875" y="3375607"/>
+            <a:ext cx="3368166" cy="369332"/>
           </a:xfrm>
           <a:prstGeom prst="rect">
             <a:avLst/>
           </a:prstGeom>
-        </p:spPr>
-      </p:pic>
+          <a:noFill/>
+        </p:spPr>
+        <p:txBody>
+          <a:bodyPr wrap="none" rtlCol="0">
+            <a:spAutoFit/>
+          </a:bodyPr>
+          <a:lstStyle/>
+          <a:p>
+            <a:r>
+              <a:rPr lang="en-US" dirty="0"/>
+              <a:t>Instrument.Oxford1820:process.vi</a:t>
+            </a:r>
+          </a:p>
+        </p:txBody>
+      </p:sp>
       <p:pic>
         <p:nvPicPr>
-          <p:cNvPr id="34" name="Picture 33">
-            <a:extLst>
-              <a:ext uri="{FF2B5EF4-FFF2-40B4-BE49-F238E27FC236}">
-                <a16:creationId xmlns:a16="http://schemas.microsoft.com/office/drawing/2014/main" id="{FABBEDA2-7C0F-4A7A-A7F6-DF1266FA83CC}"/>
-              </a:ext>
-            </a:extLst>
-          </p:cNvPr>
-          <p:cNvPicPr>
-            <a:picLocks noChangeAspect="1"/>
-          </p:cNvPicPr>
-          <p:nvPr/>
-        </p:nvPicPr>
-        <p:blipFill>
-          <a:blip r:embed="rId7"/>
-          <a:stretch>
-            <a:fillRect/>
-          </a:stretch>
-        </p:blipFill>
-        <p:spPr>
-          <a:xfrm>
-            <a:off x="8007789" y="2095500"/>
-            <a:ext cx="638175" cy="304800"/>
-          </a:xfrm>
-          <a:prstGeom prst="rect">
-            <a:avLst/>
-          </a:prstGeom>
-        </p:spPr>
-      </p:pic>
-      <p:pic>
-        <p:nvPicPr>
-          <p:cNvPr id="35" name="Picture 34">
-            <a:extLst>
-              <a:ext uri="{FF2B5EF4-FFF2-40B4-BE49-F238E27FC236}">
-                <a16:creationId xmlns:a16="http://schemas.microsoft.com/office/drawing/2014/main" id="{2EFCF48F-140E-4EE0-AD69-9FD41168B2D4}"/>
-              </a:ext>
-            </a:extLst>
-          </p:cNvPr>
-          <p:cNvPicPr>
-            <a:picLocks noChangeAspect="1"/>
-          </p:cNvPicPr>
-          <p:nvPr/>
-        </p:nvPicPr>
-        <p:blipFill>
-          <a:blip r:embed="rId8"/>
-          <a:stretch>
-            <a:fillRect/>
-          </a:stretch>
-        </p:blipFill>
-        <p:spPr>
-          <a:xfrm>
-            <a:off x="6559513" y="2119313"/>
-            <a:ext cx="1304925" cy="304800"/>
-          </a:xfrm>
-          <a:prstGeom prst="rect">
-            <a:avLst/>
-          </a:prstGeom>
-        </p:spPr>
-      </p:pic>
-      <p:pic>
-        <p:nvPicPr>
-          <p:cNvPr id="36" name="Picture 35">
-            <a:extLst>
-              <a:ext uri="{FF2B5EF4-FFF2-40B4-BE49-F238E27FC236}">
-                <a16:creationId xmlns:a16="http://schemas.microsoft.com/office/drawing/2014/main" id="{7C9B6F85-7BF1-45FE-82E5-7F12D7278C6E}"/>
-              </a:ext>
-            </a:extLst>
-          </p:cNvPr>
-          <p:cNvPicPr>
-            <a:picLocks noChangeAspect="1"/>
-          </p:cNvPicPr>
-          <p:nvPr/>
-        </p:nvPicPr>
-        <p:blipFill>
-          <a:blip r:embed="rId9"/>
-          <a:stretch>
-            <a:fillRect/>
-          </a:stretch>
-        </p:blipFill>
-        <p:spPr>
-          <a:xfrm>
-            <a:off x="8788005" y="2095500"/>
-            <a:ext cx="638175" cy="304800"/>
-          </a:xfrm>
-          <a:prstGeom prst="rect">
-            <a:avLst/>
-          </a:prstGeom>
-        </p:spPr>
-      </p:pic>
-      <p:pic>
-        <p:nvPicPr>
-          <p:cNvPr id="1031" name="Picture 1030">
-            <a:extLst>
-              <a:ext uri="{FF2B5EF4-FFF2-40B4-BE49-F238E27FC236}">
-                <a16:creationId xmlns:a16="http://schemas.microsoft.com/office/drawing/2014/main" id="{A426A376-C2EB-4C92-8769-031B53DE0B1D}"/>
-              </a:ext>
-            </a:extLst>
-          </p:cNvPr>
-          <p:cNvPicPr>
-            <a:picLocks noChangeAspect="1"/>
-          </p:cNvPicPr>
-          <p:nvPr/>
-        </p:nvPicPr>
-        <p:blipFill>
-          <a:blip r:embed="rId10"/>
-          <a:stretch>
-            <a:fillRect/>
-          </a:stretch>
-        </p:blipFill>
-        <p:spPr>
-          <a:xfrm>
-            <a:off x="5961461" y="4742497"/>
-            <a:ext cx="304800" cy="304800"/>
-          </a:xfrm>
-          <a:prstGeom prst="rect">
-            <a:avLst/>
-          </a:prstGeom>
-        </p:spPr>
-      </p:pic>
-      <p:pic>
-        <p:nvPicPr>
-          <p:cNvPr id="1033" name="Picture 1032">
-            <a:extLst>
-              <a:ext uri="{FF2B5EF4-FFF2-40B4-BE49-F238E27FC236}">
-                <a16:creationId xmlns:a16="http://schemas.microsoft.com/office/drawing/2014/main" id="{0C10ABFE-C3B4-4808-88F8-FCF94D9D9D29}"/>
-              </a:ext>
-            </a:extLst>
-          </p:cNvPr>
-          <p:cNvPicPr>
-            <a:picLocks noChangeAspect="1"/>
-          </p:cNvPicPr>
-          <p:nvPr/>
-        </p:nvPicPr>
-        <p:blipFill>
-          <a:blip r:embed="rId11"/>
-          <a:stretch>
-            <a:fillRect/>
-          </a:stretch>
-        </p:blipFill>
-        <p:spPr>
-          <a:xfrm>
-            <a:off x="4035864" y="3998919"/>
-            <a:ext cx="3971925" cy="304800"/>
-          </a:xfrm>
-          <a:prstGeom prst="rect">
-            <a:avLst/>
-          </a:prstGeom>
-        </p:spPr>
-      </p:pic>
-      <p:pic>
-        <p:nvPicPr>
-          <p:cNvPr id="1034" name="Picture 1033">
-            <a:extLst>
-              <a:ext uri="{FF2B5EF4-FFF2-40B4-BE49-F238E27FC236}">
-                <a16:creationId xmlns:a16="http://schemas.microsoft.com/office/drawing/2014/main" id="{24D7F6A3-6B36-4A6A-A3E9-2AF5AE55A96E}"/>
+          <p:cNvPr id="90" name="Picture 89">
+            <a:extLst>
+              <a:ext uri="{FF2B5EF4-FFF2-40B4-BE49-F238E27FC236}">
+                <a16:creationId xmlns:a16="http://schemas.microsoft.com/office/drawing/2014/main" id="{183C1F56-363D-4CC2-AB97-E0AD407C96EF}"/>
               </a:ext>
             </a:extLst>
           </p:cNvPr>
@@ -4185,7 +4527,7 @@
         </p:blipFill>
         <p:spPr>
           <a:xfrm>
-            <a:off x="3390900" y="3998919"/>
+            <a:off x="2731648" y="3893906"/>
             <a:ext cx="304800" cy="304800"/>
           </a:xfrm>
           <a:prstGeom prst="rect">
@@ -4195,10 +4537,10 @@
       </p:pic>
       <p:pic>
         <p:nvPicPr>
-          <p:cNvPr id="1035" name="Picture 1034">
-            <a:extLst>
-              <a:ext uri="{FF2B5EF4-FFF2-40B4-BE49-F238E27FC236}">
-                <a16:creationId xmlns:a16="http://schemas.microsoft.com/office/drawing/2014/main" id="{F1836E26-9C77-4D26-ADCA-A09A8850F1D0}"/>
+          <p:cNvPr id="94" name="Picture 93">
+            <a:extLst>
+              <a:ext uri="{FF2B5EF4-FFF2-40B4-BE49-F238E27FC236}">
+                <a16:creationId xmlns:a16="http://schemas.microsoft.com/office/drawing/2014/main" id="{9B8697E4-5F1D-4023-A2F7-955A61C8C816}"/>
               </a:ext>
             </a:extLst>
           </p:cNvPr>
@@ -4208,14 +4550,14 @@
           <p:nvPr/>
         </p:nvPicPr>
         <p:blipFill>
-          <a:blip r:embed="rId13"/>
+          <a:blip r:embed="rId2"/>
           <a:stretch>
             <a:fillRect/>
           </a:stretch>
         </p:blipFill>
         <p:spPr>
           <a:xfrm>
-            <a:off x="2745936" y="3979869"/>
+            <a:off x="2738792" y="2884925"/>
             <a:ext cx="304800" cy="304800"/>
           </a:xfrm>
           <a:prstGeom prst="rect">
@@ -4223,186 +4565,447 @@
           </a:prstGeom>
         </p:spPr>
       </p:pic>
-      <p:sp>
-        <p:nvSpPr>
-          <p:cNvPr id="1036" name="TextBox 1035">
-            <a:extLst>
-              <a:ext uri="{FF2B5EF4-FFF2-40B4-BE49-F238E27FC236}">
-                <a16:creationId xmlns:a16="http://schemas.microsoft.com/office/drawing/2014/main" id="{A93A6ED4-6CCB-4CBB-B97D-A96799F36608}"/>
-              </a:ext>
-            </a:extLst>
-          </p:cNvPr>
-          <p:cNvSpPr txBox="1"/>
+      <p:cxnSp>
+        <p:nvCxnSpPr>
+          <p:cNvPr id="1055" name="Straight Arrow Connector 1054">
+            <a:extLst>
+              <a:ext uri="{FF2B5EF4-FFF2-40B4-BE49-F238E27FC236}">
+                <a16:creationId xmlns:a16="http://schemas.microsoft.com/office/drawing/2014/main" id="{D0A72A0B-B39C-476A-B2A8-ECB345B5A508}"/>
+              </a:ext>
+            </a:extLst>
+          </p:cNvPr>
+          <p:cNvCxnSpPr>
+            <a:stCxn id="90" idx="0"/>
+            <a:endCxn id="94" idx="2"/>
+          </p:cNvCxnSpPr>
           <p:nvPr/>
-        </p:nvSpPr>
-        <p:spPr>
-          <a:xfrm>
-            <a:off x="8326876" y="4903112"/>
-            <a:ext cx="3626249" cy="369332"/>
+        </p:nvCxnSpPr>
+        <p:spPr>
+          <a:xfrm flipV="1">
+            <a:off x="2884048" y="3189725"/>
+            <a:ext cx="7144" cy="704181"/>
+          </a:xfrm>
+          <a:prstGeom prst="straightConnector1">
+            <a:avLst/>
+          </a:prstGeom>
+          <a:ln>
+            <a:tailEnd type="triangle"/>
+          </a:ln>
+        </p:spPr>
+        <p:style>
+          <a:lnRef idx="1">
+            <a:schemeClr val="accent1"/>
+          </a:lnRef>
+          <a:fillRef idx="0">
+            <a:schemeClr val="accent1"/>
+          </a:fillRef>
+          <a:effectRef idx="0">
+            <a:schemeClr val="accent1"/>
+          </a:effectRef>
+          <a:fontRef idx="minor">
+            <a:schemeClr val="tx1"/>
+          </a:fontRef>
+        </p:style>
+      </p:cxnSp>
+      <p:cxnSp>
+        <p:nvCxnSpPr>
+          <p:cNvPr id="1062" name="Connector: Curved 1061">
+            <a:extLst>
+              <a:ext uri="{FF2B5EF4-FFF2-40B4-BE49-F238E27FC236}">
+                <a16:creationId xmlns:a16="http://schemas.microsoft.com/office/drawing/2014/main" id="{655EAF2A-4A41-4DF6-BEA4-B2C04B993056}"/>
+              </a:ext>
+            </a:extLst>
+          </p:cNvPr>
+          <p:cNvCxnSpPr>
+            <a:cxnSpLocks/>
+            <a:stCxn id="94" idx="3"/>
+            <a:endCxn id="1063" idx="1"/>
+          </p:cNvCxnSpPr>
+          <p:nvPr/>
+        </p:nvCxnSpPr>
+        <p:spPr>
+          <a:xfrm>
+            <a:off x="3043592" y="3037325"/>
+            <a:ext cx="454434" cy="1472"/>
+          </a:xfrm>
+          <a:prstGeom prst="curvedConnector3">
+            <a:avLst>
+              <a:gd name="adj1" fmla="val 50000"/>
+            </a:avLst>
+          </a:prstGeom>
+          <a:ln>
+            <a:tailEnd type="triangle"/>
+          </a:ln>
+        </p:spPr>
+        <p:style>
+          <a:lnRef idx="1">
+            <a:schemeClr val="accent1"/>
+          </a:lnRef>
+          <a:fillRef idx="0">
+            <a:schemeClr val="accent1"/>
+          </a:fillRef>
+          <a:effectRef idx="0">
+            <a:schemeClr val="accent1"/>
+          </a:effectRef>
+          <a:fontRef idx="minor">
+            <a:schemeClr val="tx1"/>
+          </a:fontRef>
+        </p:style>
+      </p:cxnSp>
+      <p:pic>
+        <p:nvPicPr>
+          <p:cNvPr id="1063" name="Picture 1062">
+            <a:extLst>
+              <a:ext uri="{FF2B5EF4-FFF2-40B4-BE49-F238E27FC236}">
+                <a16:creationId xmlns:a16="http://schemas.microsoft.com/office/drawing/2014/main" id="{2DEBCDD9-FBC0-48B6-AE24-CD28E451E175}"/>
+              </a:ext>
+            </a:extLst>
+          </p:cNvPr>
+          <p:cNvPicPr>
+            <a:picLocks noChangeAspect="1"/>
+          </p:cNvPicPr>
+          <p:nvPr/>
+        </p:nvPicPr>
+        <p:blipFill>
+          <a:blip r:embed="rId14"/>
+          <a:stretch>
+            <a:fillRect/>
+          </a:stretch>
+        </p:blipFill>
+        <p:spPr>
+          <a:xfrm>
+            <a:off x="3498026" y="2886397"/>
+            <a:ext cx="304800" cy="304800"/>
           </a:xfrm>
           <a:prstGeom prst="rect">
             <a:avLst/>
           </a:prstGeom>
-          <a:noFill/>
-        </p:spPr>
-        <p:txBody>
-          <a:bodyPr wrap="none" rtlCol="0">
-            <a:spAutoFit/>
-          </a:bodyPr>
-          <a:lstStyle/>
-          <a:p>
-            <a:r>
-              <a:rPr lang="en-US" dirty="0"/>
-              <a:t>Instrument.Oxford1820 </a:t>
-            </a:r>
-            <a:r>
-              <a:rPr lang="en-US" dirty="0" err="1"/>
-              <a:t>UI:process.vi</a:t>
-            </a:r>
-            <a:endParaRPr lang="en-US" dirty="0"/>
-          </a:p>
-        </p:txBody>
-      </p:sp>
-      <p:sp>
-        <p:nvSpPr>
-          <p:cNvPr id="77" name="TextBox 76">
-            <a:extLst>
-              <a:ext uri="{FF2B5EF4-FFF2-40B4-BE49-F238E27FC236}">
-                <a16:creationId xmlns:a16="http://schemas.microsoft.com/office/drawing/2014/main" id="{DE7C63F0-8702-4585-832D-CE41A0776329}"/>
-              </a:ext>
-            </a:extLst>
-          </p:cNvPr>
-          <p:cNvSpPr txBox="1"/>
+        </p:spPr>
+      </p:pic>
+      <p:cxnSp>
+        <p:nvCxnSpPr>
+          <p:cNvPr id="119" name="Connector: Curved 118">
+            <a:extLst>
+              <a:ext uri="{FF2B5EF4-FFF2-40B4-BE49-F238E27FC236}">
+                <a16:creationId xmlns:a16="http://schemas.microsoft.com/office/drawing/2014/main" id="{2AF61E61-D08A-4BD2-A2B3-0DB776EF7EF0}"/>
+              </a:ext>
+            </a:extLst>
+          </p:cNvPr>
+          <p:cNvCxnSpPr>
+            <a:cxnSpLocks/>
+            <a:stCxn id="1063" idx="3"/>
+            <a:endCxn id="82" idx="0"/>
+          </p:cNvCxnSpPr>
           <p:nvPr/>
-        </p:nvSpPr>
-        <p:spPr>
-          <a:xfrm>
-            <a:off x="8326875" y="3457336"/>
-            <a:ext cx="3368166" cy="369332"/>
+        </p:nvCxnSpPr>
+        <p:spPr>
+          <a:xfrm>
+            <a:off x="3802826" y="3038797"/>
+            <a:ext cx="454435" cy="189268"/>
+          </a:xfrm>
+          <a:prstGeom prst="curvedConnector2">
+            <a:avLst/>
+          </a:prstGeom>
+          <a:ln>
+            <a:tailEnd type="triangle"/>
+          </a:ln>
+        </p:spPr>
+        <p:style>
+          <a:lnRef idx="1">
+            <a:schemeClr val="accent1"/>
+          </a:lnRef>
+          <a:fillRef idx="0">
+            <a:schemeClr val="accent1"/>
+          </a:fillRef>
+          <a:effectRef idx="0">
+            <a:schemeClr val="accent1"/>
+          </a:effectRef>
+          <a:fontRef idx="minor">
+            <a:schemeClr val="tx1"/>
+          </a:fontRef>
+        </p:style>
+      </p:cxnSp>
+      <p:pic>
+        <p:nvPicPr>
+          <p:cNvPr id="1072" name="Picture 1071">
+            <a:extLst>
+              <a:ext uri="{FF2B5EF4-FFF2-40B4-BE49-F238E27FC236}">
+                <a16:creationId xmlns:a16="http://schemas.microsoft.com/office/drawing/2014/main" id="{9FE32209-DB1F-4F63-90E5-4E66C3DF6292}"/>
+              </a:ext>
+            </a:extLst>
+          </p:cNvPr>
+          <p:cNvPicPr>
+            <a:picLocks noChangeAspect="1"/>
+          </p:cNvPicPr>
+          <p:nvPr/>
+        </p:nvPicPr>
+        <p:blipFill>
+          <a:blip r:embed="rId15"/>
+          <a:stretch>
+            <a:fillRect/>
+          </a:stretch>
+        </p:blipFill>
+        <p:spPr>
+          <a:xfrm>
+            <a:off x="4035863" y="4751155"/>
+            <a:ext cx="3971925" cy="304800"/>
           </a:xfrm>
           <a:prstGeom prst="rect">
             <a:avLst/>
           </a:prstGeom>
-          <a:noFill/>
-        </p:spPr>
-        <p:txBody>
-          <a:bodyPr wrap="none" rtlCol="0">
-            <a:spAutoFit/>
-          </a:bodyPr>
-          <a:lstStyle/>
-          <a:p>
-            <a:r>
-              <a:rPr lang="en-US" dirty="0"/>
-              <a:t>Instrument.Oxford1820:process.vi</a:t>
-            </a:r>
-          </a:p>
-        </p:txBody>
-      </p:sp>
-      <p:sp>
-        <p:nvSpPr>
-          <p:cNvPr id="78" name="TextBox 77">
-            <a:extLst>
-              <a:ext uri="{FF2B5EF4-FFF2-40B4-BE49-F238E27FC236}">
-                <a16:creationId xmlns:a16="http://schemas.microsoft.com/office/drawing/2014/main" id="{3C36F368-84F4-4661-8752-9AAAAD98E84C}"/>
-              </a:ext>
-            </a:extLst>
-          </p:cNvPr>
-          <p:cNvSpPr txBox="1"/>
+        </p:spPr>
+      </p:pic>
+      <p:cxnSp>
+        <p:nvCxnSpPr>
+          <p:cNvPr id="1074" name="Straight Arrow Connector 1073">
+            <a:extLst>
+              <a:ext uri="{FF2B5EF4-FFF2-40B4-BE49-F238E27FC236}">
+                <a16:creationId xmlns:a16="http://schemas.microsoft.com/office/drawing/2014/main" id="{FD3A6744-8064-4038-8EC2-049288A613A1}"/>
+              </a:ext>
+            </a:extLst>
+          </p:cNvPr>
+          <p:cNvCxnSpPr>
+            <a:stCxn id="1035" idx="0"/>
+            <a:endCxn id="90" idx="2"/>
+          </p:cNvCxnSpPr>
           <p:nvPr/>
-        </p:nvSpPr>
-        <p:spPr>
-          <a:xfrm>
-            <a:off x="9609536" y="2073473"/>
-            <a:ext cx="1225207" cy="369332"/>
+        </p:nvCxnSpPr>
+        <p:spPr>
+          <a:xfrm flipH="1" flipV="1">
+            <a:off x="2884048" y="4198706"/>
+            <a:ext cx="14288" cy="552449"/>
+          </a:xfrm>
+          <a:prstGeom prst="straightConnector1">
+            <a:avLst/>
+          </a:prstGeom>
+          <a:ln>
+            <a:tailEnd type="triangle"/>
+          </a:ln>
+        </p:spPr>
+        <p:style>
+          <a:lnRef idx="1">
+            <a:schemeClr val="accent2"/>
+          </a:lnRef>
+          <a:fillRef idx="0">
+            <a:schemeClr val="accent2"/>
+          </a:fillRef>
+          <a:effectRef idx="0">
+            <a:schemeClr val="accent2"/>
+          </a:effectRef>
+          <a:fontRef idx="minor">
+            <a:schemeClr val="tx1"/>
+          </a:fontRef>
+        </p:style>
+      </p:cxnSp>
+      <p:cxnSp>
+        <p:nvCxnSpPr>
+          <p:cNvPr id="1076" name="Straight Arrow Connector 1075">
+            <a:extLst>
+              <a:ext uri="{FF2B5EF4-FFF2-40B4-BE49-F238E27FC236}">
+                <a16:creationId xmlns:a16="http://schemas.microsoft.com/office/drawing/2014/main" id="{1BE1A789-3B04-4D8A-92D2-E9061E4E2823}"/>
+              </a:ext>
+            </a:extLst>
+          </p:cNvPr>
+          <p:cNvCxnSpPr>
+            <a:stCxn id="1034" idx="0"/>
+            <a:endCxn id="1037" idx="2"/>
+          </p:cNvCxnSpPr>
+          <p:nvPr/>
+        </p:nvCxnSpPr>
+        <p:spPr>
+          <a:xfrm flipV="1">
+            <a:off x="3543300" y="4198706"/>
+            <a:ext cx="2565798" cy="552449"/>
+          </a:xfrm>
+          <a:prstGeom prst="straightConnector1">
+            <a:avLst/>
+          </a:prstGeom>
+          <a:ln>
+            <a:headEnd type="triangle"/>
+            <a:tailEnd type="triangle"/>
+          </a:ln>
+        </p:spPr>
+        <p:style>
+          <a:lnRef idx="1">
+            <a:schemeClr val="accent2"/>
+          </a:lnRef>
+          <a:fillRef idx="0">
+            <a:schemeClr val="accent2"/>
+          </a:fillRef>
+          <a:effectRef idx="0">
+            <a:schemeClr val="accent2"/>
+          </a:effectRef>
+          <a:fontRef idx="minor">
+            <a:schemeClr val="tx1"/>
+          </a:fontRef>
+        </p:style>
+      </p:cxnSp>
+      <p:cxnSp>
+        <p:nvCxnSpPr>
+          <p:cNvPr id="129" name="Straight Arrow Connector 128">
+            <a:extLst>
+              <a:ext uri="{FF2B5EF4-FFF2-40B4-BE49-F238E27FC236}">
+                <a16:creationId xmlns:a16="http://schemas.microsoft.com/office/drawing/2014/main" id="{F3A4A551-7BCA-4B83-A5B7-B2FAF8B9C006}"/>
+              </a:ext>
+            </a:extLst>
+          </p:cNvPr>
+          <p:cNvCxnSpPr>
+            <a:cxnSpLocks/>
+            <a:stCxn id="1072" idx="0"/>
+            <a:endCxn id="1037" idx="2"/>
+          </p:cNvCxnSpPr>
+          <p:nvPr/>
+        </p:nvCxnSpPr>
+        <p:spPr>
+          <a:xfrm flipV="1">
+            <a:off x="6021826" y="4198706"/>
+            <a:ext cx="87272" cy="552449"/>
+          </a:xfrm>
+          <a:prstGeom prst="straightConnector1">
+            <a:avLst/>
+          </a:prstGeom>
+          <a:ln>
+            <a:headEnd type="triangle"/>
+            <a:tailEnd type="triangle"/>
+          </a:ln>
+        </p:spPr>
+        <p:style>
+          <a:lnRef idx="1">
+            <a:schemeClr val="accent2"/>
+          </a:lnRef>
+          <a:fillRef idx="0">
+            <a:schemeClr val="accent2"/>
+          </a:fillRef>
+          <a:effectRef idx="0">
+            <a:schemeClr val="accent2"/>
+          </a:effectRef>
+          <a:fontRef idx="minor">
+            <a:schemeClr val="tx1"/>
+          </a:fontRef>
+        </p:style>
+      </p:cxnSp>
+      <p:pic>
+        <p:nvPicPr>
+          <p:cNvPr id="1080" name="Picture 1079">
+            <a:extLst>
+              <a:ext uri="{FF2B5EF4-FFF2-40B4-BE49-F238E27FC236}">
+                <a16:creationId xmlns:a16="http://schemas.microsoft.com/office/drawing/2014/main" id="{AFB6CF45-22F6-47F6-B31C-E24BE8BED41A}"/>
+              </a:ext>
+            </a:extLst>
+          </p:cNvPr>
+          <p:cNvPicPr>
+            <a:picLocks noChangeAspect="1"/>
+          </p:cNvPicPr>
+          <p:nvPr/>
+        </p:nvPicPr>
+        <p:blipFill>
+          <a:blip r:embed="rId16"/>
+          <a:stretch>
+            <a:fillRect/>
+          </a:stretch>
+        </p:blipFill>
+        <p:spPr>
+          <a:xfrm>
+            <a:off x="4104861" y="3665666"/>
+            <a:ext cx="1362075" cy="304800"/>
           </a:xfrm>
           <a:prstGeom prst="rect">
             <a:avLst/>
           </a:prstGeom>
-          <a:noFill/>
-        </p:spPr>
-        <p:txBody>
-          <a:bodyPr wrap="none" rtlCol="0">
-            <a:spAutoFit/>
-          </a:bodyPr>
-          <a:lstStyle/>
-          <a:p>
-            <a:r>
-              <a:rPr lang="en-US" dirty="0"/>
-              <a:t>HW drivers</a:t>
-            </a:r>
-          </a:p>
-        </p:txBody>
-      </p:sp>
-      <p:sp>
-        <p:nvSpPr>
-          <p:cNvPr id="79" name="TextBox 78">
-            <a:extLst>
-              <a:ext uri="{FF2B5EF4-FFF2-40B4-BE49-F238E27FC236}">
-                <a16:creationId xmlns:a16="http://schemas.microsoft.com/office/drawing/2014/main" id="{8604A7B9-2321-4857-B318-6716661D8EC7}"/>
-              </a:ext>
-            </a:extLst>
-          </p:cNvPr>
-          <p:cNvSpPr txBox="1"/>
+        </p:spPr>
+      </p:pic>
+      <p:cxnSp>
+        <p:nvCxnSpPr>
+          <p:cNvPr id="137" name="Connector: Curved 136">
+            <a:extLst>
+              <a:ext uri="{FF2B5EF4-FFF2-40B4-BE49-F238E27FC236}">
+                <a16:creationId xmlns:a16="http://schemas.microsoft.com/office/drawing/2014/main" id="{6D230D5E-F0AB-4245-99F5-11B7DE89418A}"/>
+              </a:ext>
+            </a:extLst>
+          </p:cNvPr>
+          <p:cNvCxnSpPr>
+            <a:cxnSpLocks/>
+            <a:stCxn id="82" idx="3"/>
+            <a:endCxn id="1080" idx="0"/>
+          </p:cNvCxnSpPr>
           <p:nvPr/>
-        </p:nvSpPr>
-        <p:spPr>
-          <a:xfrm>
-            <a:off x="8397333" y="3955818"/>
-            <a:ext cx="2958117" cy="369332"/>
-          </a:xfrm>
-          <a:prstGeom prst="rect">
+        </p:nvCxnSpPr>
+        <p:spPr>
+          <a:xfrm>
+            <a:off x="4409661" y="3380465"/>
+            <a:ext cx="376238" cy="285201"/>
+          </a:xfrm>
+          <a:prstGeom prst="curvedConnector2">
             <a:avLst/>
           </a:prstGeom>
-          <a:noFill/>
-        </p:spPr>
-        <p:txBody>
-          <a:bodyPr wrap="none" rtlCol="0">
-            <a:spAutoFit/>
-          </a:bodyPr>
-          <a:lstStyle/>
-          <a:p>
-            <a:r>
-              <a:rPr lang="en-US" dirty="0"/>
-              <a:t>Remote Community Methods</a:t>
-            </a:r>
-          </a:p>
-        </p:txBody>
-      </p:sp>
-      <p:sp>
-        <p:nvSpPr>
-          <p:cNvPr id="80" name="TextBox 79">
-            <a:extLst>
-              <a:ext uri="{FF2B5EF4-FFF2-40B4-BE49-F238E27FC236}">
-                <a16:creationId xmlns:a16="http://schemas.microsoft.com/office/drawing/2014/main" id="{FBD0E06A-C2ED-4D94-8808-B3293380F5A5}"/>
-              </a:ext>
-            </a:extLst>
-          </p:cNvPr>
-          <p:cNvSpPr txBox="1"/>
+          <a:ln>
+            <a:tailEnd type="triangle"/>
+          </a:ln>
+        </p:spPr>
+        <p:style>
+          <a:lnRef idx="1">
+            <a:schemeClr val="accent1"/>
+          </a:lnRef>
+          <a:fillRef idx="0">
+            <a:schemeClr val="accent1"/>
+          </a:fillRef>
+          <a:effectRef idx="0">
+            <a:schemeClr val="accent1"/>
+          </a:effectRef>
+          <a:fontRef idx="minor">
+            <a:schemeClr val="tx1"/>
+          </a:fontRef>
+        </p:style>
+      </p:cxnSp>
+      <p:cxnSp>
+        <p:nvCxnSpPr>
+          <p:cNvPr id="141" name="Straight Arrow Connector 140">
+            <a:extLst>
+              <a:ext uri="{FF2B5EF4-FFF2-40B4-BE49-F238E27FC236}">
+                <a16:creationId xmlns:a16="http://schemas.microsoft.com/office/drawing/2014/main" id="{85B98EAB-2DA1-4493-AF26-A57459B4D1FF}"/>
+              </a:ext>
+            </a:extLst>
+          </p:cNvPr>
+          <p:cNvCxnSpPr>
+            <a:cxnSpLocks/>
+            <a:stCxn id="1037" idx="1"/>
+            <a:endCxn id="1080" idx="3"/>
+          </p:cNvCxnSpPr>
           <p:nvPr/>
-        </p:nvSpPr>
-        <p:spPr>
-          <a:xfrm>
-            <a:off x="1277387" y="3971416"/>
-            <a:ext cx="1279389" cy="369332"/>
-          </a:xfrm>
-          <a:prstGeom prst="rect">
+        </p:nvCxnSpPr>
+        <p:spPr>
+          <a:xfrm flipH="1" flipV="1">
+            <a:off x="5466936" y="3818066"/>
+            <a:ext cx="489762" cy="228240"/>
+          </a:xfrm>
+          <a:prstGeom prst="straightConnector1">
             <a:avLst/>
           </a:prstGeom>
-          <a:noFill/>
-        </p:spPr>
-        <p:txBody>
-          <a:bodyPr wrap="none" rtlCol="0">
-            <a:spAutoFit/>
-          </a:bodyPr>
-          <a:lstStyle/>
-          <a:p>
-            <a:r>
-              <a:rPr lang="en-US" dirty="0"/>
-              <a:t>Remote API</a:t>
-            </a:r>
-          </a:p>
-        </p:txBody>
-      </p:sp>
+          <a:ln w="9525" cap="flat" cmpd="sng" algn="ctr">
+            <a:solidFill>
+              <a:schemeClr val="accent1"/>
+            </a:solidFill>
+            <a:prstDash val="solid"/>
+            <a:round/>
+            <a:headEnd type="arrow" w="med" len="med"/>
+            <a:tailEnd type="arrow" w="med" len="med"/>
+          </a:ln>
+        </p:spPr>
+        <p:style>
+          <a:lnRef idx="0">
+            <a:scrgbClr r="0" g="0" b="0"/>
+          </a:lnRef>
+          <a:fillRef idx="0">
+            <a:scrgbClr r="0" g="0" b="0"/>
+          </a:fillRef>
+          <a:effectRef idx="0">
+            <a:scrgbClr r="0" g="0" b="0"/>
+          </a:effectRef>
+          <a:fontRef idx="minor">
+            <a:schemeClr val="tx1"/>
+          </a:fontRef>
+        </p:style>
+      </p:cxnSp>
     </p:spTree>
     <p:extLst>
       <p:ext uri="{BB962C8B-B14F-4D97-AF65-F5344CB8AC3E}">

</xml_diff>